<commit_message>
Video in Präsentation eingebettet
</commit_message>
<xml_diff>
--- a/Präsentationen/Finale Präsentation/Finale-Präsentation-Rift-Wingsuit.pptx
+++ b/Präsentationen/Finale Präsentation/Finale-Präsentation-Rift-Wingsuit.pptx
@@ -141,7 +141,7 @@
   </p:defaultTextStyle>
   <p:extLst>
     <p:ext uri="{EFAFB233-063F-42B5-8137-9DF3F51BA10A}">
-      <p15:sldGuideLst xmlns:p15="http://schemas.microsoft.com/office/powerpoint/2012/main">
+      <p15:sldGuideLst xmlns="" xmlns:p15="http://schemas.microsoft.com/office/powerpoint/2012/main">
         <p15:guide id="1" orient="horz" pos="1800">
           <p15:clr>
             <a:srgbClr val="A4A3A4"/>
@@ -241,7 +241,7 @@
             <a:fld id="{243825A9-FBEC-4183-9E10-7EA49C7B85FB}" type="datetimeFigureOut">
               <a:rPr lang="de-DE" smtClean="0"/>
               <a:pPr/>
-              <a:t>12.10.2015</a:t>
+              <a:t>14.10.15</a:t>
             </a:fld>
             <a:endParaRPr lang="de-DE"/>
           </a:p>
@@ -412,7 +412,7 @@
     </p:spTree>
     <p:extLst>
       <p:ext uri="{BB962C8B-B14F-4D97-AF65-F5344CB8AC3E}">
-        <p14:creationId xmlns:p14="http://schemas.microsoft.com/office/powerpoint/2010/main" val="4080956456"/>
+        <p14:creationId xmlns="" xmlns:p14="http://schemas.microsoft.com/office/powerpoint/2010/main" val="4080956456"/>
       </p:ext>
     </p:extLst>
   </p:cSld>
@@ -512,6 +512,460 @@
 </p:notesMaster>
 </file>
 
+<file path=ppt/notesSlides/notesSlide1.xml><?xml version="1.0" encoding="utf-8"?>
+<p:notes xmlns:a="http://schemas.openxmlformats.org/drawingml/2006/main" xmlns:r="http://schemas.openxmlformats.org/officeDocument/2006/relationships" xmlns:p="http://schemas.openxmlformats.org/presentationml/2006/main">
+  <p:cSld>
+    <p:spTree>
+      <p:nvGrpSpPr>
+        <p:cNvPr id="1" name=""/>
+        <p:cNvGrpSpPr/>
+        <p:nvPr/>
+      </p:nvGrpSpPr>
+      <p:grpSpPr>
+        <a:xfrm>
+          <a:off x="0" y="0"/>
+          <a:ext cx="0" cy="0"/>
+          <a:chOff x="0" y="0"/>
+          <a:chExt cx="0" cy="0"/>
+        </a:xfrm>
+      </p:grpSpPr>
+      <p:sp>
+        <p:nvSpPr>
+          <p:cNvPr id="2" name="Folienbildplatzhalter 1"/>
+          <p:cNvSpPr>
+            <a:spLocks noGrp="1" noRot="1" noChangeAspect="1"/>
+          </p:cNvSpPr>
+          <p:nvPr>
+            <p:ph type="sldImg"/>
+          </p:nvPr>
+        </p:nvSpPr>
+        <p:spPr/>
+      </p:sp>
+      <p:sp>
+        <p:nvSpPr>
+          <p:cNvPr id="3" name="Notizenplatzhalter 2"/>
+          <p:cNvSpPr>
+            <a:spLocks noGrp="1"/>
+          </p:cNvSpPr>
+          <p:nvPr>
+            <p:ph type="body" idx="1"/>
+          </p:nvPr>
+        </p:nvSpPr>
+        <p:spPr/>
+        <p:txBody>
+          <a:bodyPr>
+            <a:normAutofit/>
+          </a:bodyPr>
+          <a:lstStyle/>
+          <a:p>
+            <a:r>
+              <a:rPr lang="de-DE" dirty="0" smtClean="0"/>
+              <a:t>Ambiente -&gt; </a:t>
+            </a:r>
+            <a:r>
+              <a:rPr lang="de-DE" dirty="0" err="1" smtClean="0"/>
+              <a:t>Lighting</a:t>
+            </a:r>
+            <a:r>
+              <a:rPr lang="de-DE" dirty="0" smtClean="0"/>
+              <a:t>, </a:t>
+            </a:r>
+            <a:r>
+              <a:rPr lang="de-DE" dirty="0" err="1" smtClean="0"/>
+              <a:t>Terrarforming</a:t>
+            </a:r>
+            <a:r>
+              <a:rPr lang="de-DE" dirty="0" smtClean="0"/>
+              <a:t> </a:t>
+            </a:r>
+            <a:r>
+              <a:rPr lang="de-DE" dirty="0" err="1" smtClean="0"/>
+              <a:t>usw</a:t>
+            </a:r>
+            <a:endParaRPr lang="de-DE" dirty="0"/>
+          </a:p>
+        </p:txBody>
+      </p:sp>
+      <p:sp>
+        <p:nvSpPr>
+          <p:cNvPr id="4" name="Foliennummernplatzhalter 3"/>
+          <p:cNvSpPr>
+            <a:spLocks noGrp="1"/>
+          </p:cNvSpPr>
+          <p:nvPr>
+            <p:ph type="sldNum" sz="quarter" idx="10"/>
+          </p:nvPr>
+        </p:nvSpPr>
+        <p:spPr/>
+        <p:txBody>
+          <a:bodyPr/>
+          <a:lstStyle/>
+          <a:p>
+            <a:fld id="{4908E361-B94C-4A25-AE9E-7E0532BAF813}" type="slidenum">
+              <a:rPr lang="de-DE" smtClean="0"/>
+              <a:pPr/>
+              <a:t>4</a:t>
+            </a:fld>
+            <a:endParaRPr lang="de-DE"/>
+          </a:p>
+        </p:txBody>
+      </p:sp>
+    </p:spTree>
+  </p:cSld>
+  <p:clrMapOvr>
+    <a:masterClrMapping/>
+  </p:clrMapOvr>
+</p:notes>
+</file>
+
+<file path=ppt/notesSlides/notesSlide2.xml><?xml version="1.0" encoding="utf-8"?>
+<p:notes xmlns:a="http://schemas.openxmlformats.org/drawingml/2006/main" xmlns:r="http://schemas.openxmlformats.org/officeDocument/2006/relationships" xmlns:p="http://schemas.openxmlformats.org/presentationml/2006/main">
+  <p:cSld>
+    <p:spTree>
+      <p:nvGrpSpPr>
+        <p:cNvPr id="1" name=""/>
+        <p:cNvGrpSpPr/>
+        <p:nvPr/>
+      </p:nvGrpSpPr>
+      <p:grpSpPr>
+        <a:xfrm>
+          <a:off x="0" y="0"/>
+          <a:ext cx="0" cy="0"/>
+          <a:chOff x="0" y="0"/>
+          <a:chExt cx="0" cy="0"/>
+        </a:xfrm>
+      </p:grpSpPr>
+      <p:sp>
+        <p:nvSpPr>
+          <p:cNvPr id="2" name="Folienbildplatzhalter 1"/>
+          <p:cNvSpPr>
+            <a:spLocks noGrp="1" noRot="1" noChangeAspect="1"/>
+          </p:cNvSpPr>
+          <p:nvPr>
+            <p:ph type="sldImg"/>
+          </p:nvPr>
+        </p:nvSpPr>
+        <p:spPr/>
+      </p:sp>
+      <p:sp>
+        <p:nvSpPr>
+          <p:cNvPr id="3" name="Notizenplatzhalter 2"/>
+          <p:cNvSpPr>
+            <a:spLocks noGrp="1"/>
+          </p:cNvSpPr>
+          <p:nvPr>
+            <p:ph type="body" idx="1"/>
+          </p:nvPr>
+        </p:nvSpPr>
+        <p:spPr/>
+        <p:txBody>
+          <a:bodyPr>
+            <a:normAutofit/>
+          </a:bodyPr>
+          <a:lstStyle/>
+          <a:p>
+            <a:r>
+              <a:rPr lang="de-DE" sz="1400" dirty="0" smtClean="0"/>
+              <a:t>Ist</a:t>
+            </a:r>
+            <a:r>
+              <a:rPr lang="de-DE" sz="1400" baseline="0" dirty="0" smtClean="0"/>
+              <a:t> mehr oder weniger immer noch ein Mock-</a:t>
+            </a:r>
+            <a:r>
+              <a:rPr lang="de-DE" sz="1400" baseline="0" dirty="0" err="1" smtClean="0"/>
+              <a:t>Object</a:t>
+            </a:r>
+            <a:endParaRPr lang="de-DE" sz="1400" dirty="0"/>
+          </a:p>
+        </p:txBody>
+      </p:sp>
+      <p:sp>
+        <p:nvSpPr>
+          <p:cNvPr id="4" name="Foliennummernplatzhalter 3"/>
+          <p:cNvSpPr>
+            <a:spLocks noGrp="1"/>
+          </p:cNvSpPr>
+          <p:nvPr>
+            <p:ph type="sldNum" sz="quarter" idx="10"/>
+          </p:nvPr>
+        </p:nvSpPr>
+        <p:spPr/>
+        <p:txBody>
+          <a:bodyPr/>
+          <a:lstStyle/>
+          <a:p>
+            <a:fld id="{4908E361-B94C-4A25-AE9E-7E0532BAF813}" type="slidenum">
+              <a:rPr lang="de-DE" smtClean="0"/>
+              <a:pPr/>
+              <a:t>7</a:t>
+            </a:fld>
+            <a:endParaRPr lang="de-DE"/>
+          </a:p>
+        </p:txBody>
+      </p:sp>
+    </p:spTree>
+  </p:cSld>
+  <p:clrMapOvr>
+    <a:masterClrMapping/>
+  </p:clrMapOvr>
+</p:notes>
+</file>
+
+<file path=ppt/notesSlides/notesSlide3.xml><?xml version="1.0" encoding="utf-8"?>
+<p:notes xmlns:a="http://schemas.openxmlformats.org/drawingml/2006/main" xmlns:r="http://schemas.openxmlformats.org/officeDocument/2006/relationships" xmlns:p="http://schemas.openxmlformats.org/presentationml/2006/main">
+  <p:cSld>
+    <p:spTree>
+      <p:nvGrpSpPr>
+        <p:cNvPr id="1" name=""/>
+        <p:cNvGrpSpPr/>
+        <p:nvPr/>
+      </p:nvGrpSpPr>
+      <p:grpSpPr>
+        <a:xfrm>
+          <a:off x="0" y="0"/>
+          <a:ext cx="0" cy="0"/>
+          <a:chOff x="0" y="0"/>
+          <a:chExt cx="0" cy="0"/>
+        </a:xfrm>
+      </p:grpSpPr>
+      <p:sp>
+        <p:nvSpPr>
+          <p:cNvPr id="2" name="Folienbildplatzhalter 1"/>
+          <p:cNvSpPr>
+            <a:spLocks noGrp="1" noRot="1" noChangeAspect="1"/>
+          </p:cNvSpPr>
+          <p:nvPr>
+            <p:ph type="sldImg"/>
+          </p:nvPr>
+        </p:nvSpPr>
+        <p:spPr/>
+      </p:sp>
+      <p:sp>
+        <p:nvSpPr>
+          <p:cNvPr id="3" name="Notizenplatzhalter 2"/>
+          <p:cNvSpPr>
+            <a:spLocks noGrp="1"/>
+          </p:cNvSpPr>
+          <p:nvPr>
+            <p:ph type="body" idx="1"/>
+          </p:nvPr>
+        </p:nvSpPr>
+        <p:spPr/>
+        <p:txBody>
+          <a:bodyPr>
+            <a:normAutofit/>
+          </a:bodyPr>
+          <a:lstStyle/>
+          <a:p>
+            <a:endParaRPr lang="de-DE" dirty="0"/>
+          </a:p>
+        </p:txBody>
+      </p:sp>
+      <p:sp>
+        <p:nvSpPr>
+          <p:cNvPr id="4" name="Foliennummernplatzhalter 3"/>
+          <p:cNvSpPr>
+            <a:spLocks noGrp="1"/>
+          </p:cNvSpPr>
+          <p:nvPr>
+            <p:ph type="sldNum" sz="quarter" idx="10"/>
+          </p:nvPr>
+        </p:nvSpPr>
+        <p:spPr/>
+        <p:txBody>
+          <a:bodyPr/>
+          <a:lstStyle/>
+          <a:p>
+            <a:fld id="{4908E361-B94C-4A25-AE9E-7E0532BAF813}" type="slidenum">
+              <a:rPr lang="de-DE" smtClean="0"/>
+              <a:pPr/>
+              <a:t>8</a:t>
+            </a:fld>
+            <a:endParaRPr lang="de-DE"/>
+          </a:p>
+        </p:txBody>
+      </p:sp>
+    </p:spTree>
+  </p:cSld>
+  <p:clrMapOvr>
+    <a:masterClrMapping/>
+  </p:clrMapOvr>
+</p:notes>
+</file>
+
+<file path=ppt/notesSlides/notesSlide4.xml><?xml version="1.0" encoding="utf-8"?>
+<p:notes xmlns:a="http://schemas.openxmlformats.org/drawingml/2006/main" xmlns:r="http://schemas.openxmlformats.org/officeDocument/2006/relationships" xmlns:p="http://schemas.openxmlformats.org/presentationml/2006/main">
+  <p:cSld>
+    <p:spTree>
+      <p:nvGrpSpPr>
+        <p:cNvPr id="1" name=""/>
+        <p:cNvGrpSpPr/>
+        <p:nvPr/>
+      </p:nvGrpSpPr>
+      <p:grpSpPr>
+        <a:xfrm>
+          <a:off x="0" y="0"/>
+          <a:ext cx="0" cy="0"/>
+          <a:chOff x="0" y="0"/>
+          <a:chExt cx="0" cy="0"/>
+        </a:xfrm>
+      </p:grpSpPr>
+      <p:sp>
+        <p:nvSpPr>
+          <p:cNvPr id="2" name="Folienbildplatzhalter 1"/>
+          <p:cNvSpPr>
+            <a:spLocks noGrp="1" noRot="1" noChangeAspect="1"/>
+          </p:cNvSpPr>
+          <p:nvPr>
+            <p:ph type="sldImg"/>
+          </p:nvPr>
+        </p:nvSpPr>
+        <p:spPr/>
+      </p:sp>
+      <p:sp>
+        <p:nvSpPr>
+          <p:cNvPr id="3" name="Notizenplatzhalter 2"/>
+          <p:cNvSpPr>
+            <a:spLocks noGrp="1"/>
+          </p:cNvSpPr>
+          <p:nvPr>
+            <p:ph type="body" idx="1"/>
+          </p:nvPr>
+        </p:nvSpPr>
+        <p:spPr/>
+        <p:txBody>
+          <a:bodyPr>
+            <a:normAutofit/>
+          </a:bodyPr>
+          <a:lstStyle/>
+          <a:p>
+            <a:r>
+              <a:rPr lang="de-DE" dirty="0" smtClean="0"/>
+              <a:t>Rotation-Lock-X =&gt; Es</a:t>
+            </a:r>
+            <a:r>
+              <a:rPr lang="de-DE" baseline="0" dirty="0" smtClean="0"/>
+              <a:t> kann nicht übersteuert werden</a:t>
+            </a:r>
+            <a:endParaRPr lang="de-DE" dirty="0"/>
+          </a:p>
+        </p:txBody>
+      </p:sp>
+      <p:sp>
+        <p:nvSpPr>
+          <p:cNvPr id="4" name="Foliennummernplatzhalter 3"/>
+          <p:cNvSpPr>
+            <a:spLocks noGrp="1"/>
+          </p:cNvSpPr>
+          <p:nvPr>
+            <p:ph type="sldNum" sz="quarter" idx="10"/>
+          </p:nvPr>
+        </p:nvSpPr>
+        <p:spPr/>
+        <p:txBody>
+          <a:bodyPr/>
+          <a:lstStyle/>
+          <a:p>
+            <a:fld id="{4908E361-B94C-4A25-AE9E-7E0532BAF813}" type="slidenum">
+              <a:rPr lang="de-DE" smtClean="0"/>
+              <a:pPr/>
+              <a:t>10</a:t>
+            </a:fld>
+            <a:endParaRPr lang="de-DE"/>
+          </a:p>
+        </p:txBody>
+      </p:sp>
+    </p:spTree>
+  </p:cSld>
+  <p:clrMapOvr>
+    <a:masterClrMapping/>
+  </p:clrMapOvr>
+</p:notes>
+</file>
+
+<file path=ppt/notesSlides/notesSlide5.xml><?xml version="1.0" encoding="utf-8"?>
+<p:notes xmlns:a="http://schemas.openxmlformats.org/drawingml/2006/main" xmlns:r="http://schemas.openxmlformats.org/officeDocument/2006/relationships" xmlns:p="http://schemas.openxmlformats.org/presentationml/2006/main">
+  <p:cSld>
+    <p:spTree>
+      <p:nvGrpSpPr>
+        <p:cNvPr id="1" name=""/>
+        <p:cNvGrpSpPr/>
+        <p:nvPr/>
+      </p:nvGrpSpPr>
+      <p:grpSpPr>
+        <a:xfrm>
+          <a:off x="0" y="0"/>
+          <a:ext cx="0" cy="0"/>
+          <a:chOff x="0" y="0"/>
+          <a:chExt cx="0" cy="0"/>
+        </a:xfrm>
+      </p:grpSpPr>
+      <p:sp>
+        <p:nvSpPr>
+          <p:cNvPr id="2" name="Folienbildplatzhalter 1"/>
+          <p:cNvSpPr>
+            <a:spLocks noGrp="1" noRot="1" noChangeAspect="1"/>
+          </p:cNvSpPr>
+          <p:nvPr>
+            <p:ph type="sldImg"/>
+          </p:nvPr>
+        </p:nvSpPr>
+        <p:spPr/>
+      </p:sp>
+      <p:sp>
+        <p:nvSpPr>
+          <p:cNvPr id="3" name="Notizenplatzhalter 2"/>
+          <p:cNvSpPr>
+            <a:spLocks noGrp="1"/>
+          </p:cNvSpPr>
+          <p:nvPr>
+            <p:ph type="body" idx="1"/>
+          </p:nvPr>
+        </p:nvSpPr>
+        <p:spPr/>
+        <p:txBody>
+          <a:bodyPr>
+            <a:normAutofit/>
+          </a:bodyPr>
+          <a:lstStyle/>
+          <a:p>
+            <a:endParaRPr lang="de-DE" dirty="0"/>
+          </a:p>
+        </p:txBody>
+      </p:sp>
+      <p:sp>
+        <p:nvSpPr>
+          <p:cNvPr id="4" name="Foliennummernplatzhalter 3"/>
+          <p:cNvSpPr>
+            <a:spLocks noGrp="1"/>
+          </p:cNvSpPr>
+          <p:nvPr>
+            <p:ph type="sldNum" sz="quarter" idx="10"/>
+          </p:nvPr>
+        </p:nvSpPr>
+        <p:spPr/>
+        <p:txBody>
+          <a:bodyPr/>
+          <a:lstStyle/>
+          <a:p>
+            <a:fld id="{4908E361-B94C-4A25-AE9E-7E0532BAF813}" type="slidenum">
+              <a:rPr lang="de-DE" smtClean="0"/>
+              <a:pPr/>
+              <a:t>31</a:t>
+            </a:fld>
+            <a:endParaRPr lang="de-DE"/>
+          </a:p>
+        </p:txBody>
+      </p:sp>
+    </p:spTree>
+  </p:cSld>
+  <p:clrMapOvr>
+    <a:masterClrMapping/>
+  </p:clrMapOvr>
+</p:notes>
+</file>
+
 <file path=ppt/slideLayouts/slideLayout1.xml><?xml version="1.0" encoding="utf-8"?>
 <p:sldLayout xmlns:a="http://schemas.openxmlformats.org/drawingml/2006/main" xmlns:r="http://schemas.openxmlformats.org/officeDocument/2006/relationships" xmlns:p="http://schemas.openxmlformats.org/presentationml/2006/main" type="title" preserve="1">
   <p:cSld name="Titelfolie">
@@ -686,7 +1140,7 @@
             <a:fld id="{E3D2E8C1-5FD7-4691-AB68-D6297B4D5F43}" type="datetime1">
               <a:rPr lang="de-DE" smtClean="0"/>
               <a:pPr/>
-              <a:t>12.10.2015</a:t>
+              <a:t>14.10.15</a:t>
             </a:fld>
             <a:endParaRPr lang="de-DE"/>
           </a:p>
@@ -853,7 +1307,7 @@
             <a:fld id="{6555916C-EC3E-4A59-A202-E3BDAC789789}" type="datetime1">
               <a:rPr lang="de-DE" smtClean="0"/>
               <a:pPr/>
-              <a:t>12.10.2015</a:t>
+              <a:t>14.10.15</a:t>
             </a:fld>
             <a:endParaRPr lang="de-DE"/>
           </a:p>
@@ -1030,7 +1484,7 @@
             <a:fld id="{B0BAAC96-984A-4C42-A65C-1E30F77A26C5}" type="datetime1">
               <a:rPr lang="de-DE" smtClean="0"/>
               <a:pPr/>
-              <a:t>12.10.2015</a:t>
+              <a:t>14.10.15</a:t>
             </a:fld>
             <a:endParaRPr lang="de-DE"/>
           </a:p>
@@ -1197,7 +1651,7 @@
             <a:fld id="{0AF80EA2-653E-48EB-A275-D811A53BA918}" type="datetime1">
               <a:rPr lang="de-DE" smtClean="0"/>
               <a:pPr/>
-              <a:t>12.10.2015</a:t>
+              <a:t>14.10.15</a:t>
             </a:fld>
             <a:endParaRPr lang="de-DE"/>
           </a:p>
@@ -1441,7 +1895,7 @@
             <a:fld id="{E5BD76EC-8BFC-4DBC-81BC-788FF00AD01A}" type="datetime1">
               <a:rPr lang="de-DE" smtClean="0"/>
               <a:pPr/>
-              <a:t>12.10.2015</a:t>
+              <a:t>14.10.15</a:t>
             </a:fld>
             <a:endParaRPr lang="de-DE"/>
           </a:p>
@@ -1707,7 +2161,7 @@
             <a:fld id="{42D10058-B0DA-4CAD-91DA-40F8A0FB6522}" type="datetime1">
               <a:rPr lang="de-DE" smtClean="0"/>
               <a:pPr/>
-              <a:t>12.10.2015</a:t>
+              <a:t>14.10.15</a:t>
             </a:fld>
             <a:endParaRPr lang="de-DE"/>
           </a:p>
@@ -2087,7 +2541,7 @@
             <a:fld id="{30F2673F-3B0B-4E2B-A302-85F12C63CE58}" type="datetime1">
               <a:rPr lang="de-DE" smtClean="0"/>
               <a:pPr/>
-              <a:t>12.10.2015</a:t>
+              <a:t>14.10.15</a:t>
             </a:fld>
             <a:endParaRPr lang="de-DE"/>
           </a:p>
@@ -2239,7 +2693,7 @@
             <a:fld id="{99C24A88-FE37-415B-BBD5-612EBB0081EA}" type="datetime1">
               <a:rPr lang="de-DE" smtClean="0"/>
               <a:pPr/>
-              <a:t>12.10.2015</a:t>
+              <a:t>14.10.15</a:t>
             </a:fld>
             <a:endParaRPr lang="de-DE"/>
           </a:p>
@@ -2331,7 +2785,7 @@
             <a:fld id="{D4BBCC0C-5DC1-47B9-9437-A552677B599E}" type="datetime1">
               <a:rPr lang="de-DE" smtClean="0"/>
               <a:pPr/>
-              <a:t>12.10.2015</a:t>
+              <a:t>14.10.15</a:t>
             </a:fld>
             <a:endParaRPr lang="de-DE"/>
           </a:p>
@@ -2594,7 +3048,7 @@
             <a:fld id="{5D8961AA-03AC-4A6B-AD4E-C8A3670A08F8}" type="datetime1">
               <a:rPr lang="de-DE" smtClean="0"/>
               <a:pPr/>
-              <a:t>12.10.2015</a:t>
+              <a:t>14.10.15</a:t>
             </a:fld>
             <a:endParaRPr lang="de-DE"/>
           </a:p>
@@ -2884,7 +3338,7 @@
             <a:fld id="{9565BAF1-4771-44D7-80BB-E70855042F1C}" type="datetime1">
               <a:rPr lang="de-DE" smtClean="0"/>
               <a:pPr/>
-              <a:t>12.10.2015</a:t>
+              <a:t>14.10.15</a:t>
             </a:fld>
             <a:endParaRPr lang="de-DE"/>
           </a:p>
@@ -3657,7 +4111,7 @@
             <a:fld id="{48B16CC1-F4AA-4BAA-A083-6C6353824805}" type="datetime1">
               <a:rPr lang="de-DE" smtClean="0"/>
               <a:pPr/>
-              <a:t>12.10.2015</a:t>
+              <a:t>14.10.15</a:t>
             </a:fld>
             <a:endParaRPr lang="de-DE"/>
           </a:p>
@@ -4590,11 +5044,7 @@
             <a:pPr algn="ctr"/>
             <a:r>
               <a:rPr lang="de-DE" dirty="0" smtClean="0"/>
-              <a:t>Systemarchitektur </a:t>
-            </a:r>
-            <a:r>
-              <a:rPr lang="de-DE" dirty="0" smtClean="0"/>
-              <a:t>- Kinect</a:t>
+              <a:t>Systemarchitektur - Kinect</a:t>
             </a:r>
             <a:endParaRPr lang="de-DE" dirty="0"/>
           </a:p>
@@ -4639,12 +5089,41 @@
             <a:pPr lvl="1"/>
             <a:r>
               <a:rPr lang="de-DE" dirty="0" smtClean="0"/>
-              <a:t>X-Achse (Yaw</a:t>
+              <a:t>X-Achse </a:t>
+            </a:r>
+            <a:r>
+              <a:rPr lang="de-DE" dirty="0" smtClean="0"/>
+              <a:t>(</a:t>
+            </a:r>
+            <a:r>
+              <a:rPr lang="de-DE" dirty="0" err="1" smtClean="0"/>
+              <a:t>Pitch</a:t>
             </a:r>
             <a:r>
               <a:rPr lang="de-DE" sz="2200" dirty="0" smtClean="0"/>
               <a:t>)</a:t>
             </a:r>
+            <a:endParaRPr lang="de-DE" sz="2200" dirty="0" smtClean="0"/>
+          </a:p>
+          <a:p>
+            <a:pPr lvl="2"/>
+            <a:r>
+              <a:rPr lang="de-DE" dirty="0" smtClean="0"/>
+              <a:t>Forward / Back</a:t>
+            </a:r>
+            <a:endParaRPr lang="de-DE" dirty="0" smtClean="0"/>
+          </a:p>
+          <a:p>
+            <a:pPr lvl="1"/>
+            <a:r>
+              <a:rPr lang="de-DE" dirty="0" smtClean="0"/>
+              <a:t>Y-Achse </a:t>
+            </a:r>
+            <a:r>
+              <a:rPr lang="de-DE" dirty="0" smtClean="0"/>
+              <a:t>(Yaw)</a:t>
+            </a:r>
+            <a:endParaRPr lang="de-DE" dirty="0" smtClean="0"/>
           </a:p>
           <a:p>
             <a:pPr lvl="2"/>
@@ -4656,28 +5135,7 @@
               <a:rPr lang="de-DE" dirty="0" smtClean="0"/>
               <a:t> / Down</a:t>
             </a:r>
-          </a:p>
-          <a:p>
-            <a:pPr lvl="1"/>
-            <a:r>
-              <a:rPr lang="de-DE" dirty="0" smtClean="0"/>
-              <a:t>Y-Achse (</a:t>
-            </a:r>
-            <a:r>
-              <a:rPr lang="de-DE" dirty="0" err="1" smtClean="0"/>
-              <a:t>Pitch</a:t>
-            </a:r>
-            <a:r>
-              <a:rPr lang="de-DE" dirty="0" smtClean="0"/>
-              <a:t>)</a:t>
-            </a:r>
-          </a:p>
-          <a:p>
-            <a:pPr lvl="2"/>
-            <a:r>
-              <a:rPr lang="de-DE" dirty="0" smtClean="0"/>
-              <a:t>Forward / Back</a:t>
-            </a:r>
+            <a:endParaRPr lang="de-DE" dirty="0" smtClean="0"/>
           </a:p>
           <a:p>
             <a:pPr lvl="2"/>
@@ -4690,8 +5148,9 @@
             </a:r>
             <a:r>
               <a:rPr lang="de-DE" dirty="0" smtClean="0"/>
-              <a:t>-Arm -Tracking</a:t>
-            </a:r>
+              <a:t>-Arm-Tracking</a:t>
+            </a:r>
+            <a:endParaRPr lang="de-DE" dirty="0" smtClean="0"/>
           </a:p>
           <a:p>
             <a:endParaRPr lang="de-DE" dirty="0" smtClean="0"/>
@@ -4743,7 +5202,7 @@
           <p:nvPr/>
         </p:nvPicPr>
         <p:blipFill>
-          <a:blip r:embed="rId2" cstate="print"/>
+          <a:blip r:embed="rId3" cstate="print"/>
           <a:srcRect/>
           <a:stretch>
             <a:fillRect/>
@@ -4817,11 +5276,7 @@
             <a:pPr algn="ctr"/>
             <a:r>
               <a:rPr lang="de-DE" dirty="0" smtClean="0"/>
-              <a:t>Systemarchitektur </a:t>
-            </a:r>
-            <a:r>
-              <a:rPr lang="de-DE" dirty="0" smtClean="0"/>
-              <a:t>- Kinect</a:t>
+              <a:t>Systemarchitektur - Kinect</a:t>
             </a:r>
             <a:endParaRPr lang="de-DE" dirty="0"/>
           </a:p>
@@ -5191,11 +5646,7 @@
             <a:pPr algn="ctr"/>
             <a:r>
               <a:rPr lang="de-DE" dirty="0" smtClean="0"/>
-              <a:t>Systemarchitektur </a:t>
-            </a:r>
-            <a:r>
-              <a:rPr lang="de-DE" dirty="0" smtClean="0"/>
-              <a:t>– </a:t>
+              <a:t>Systemarchitektur – </a:t>
             </a:r>
             <a:r>
               <a:rPr lang="de-DE" dirty="0" err="1" smtClean="0"/>
@@ -5436,11 +5887,7 @@
             <a:pPr algn="ctr"/>
             <a:r>
               <a:rPr lang="de-DE" dirty="0" smtClean="0"/>
-              <a:t>Systemarchitektur </a:t>
-            </a:r>
-            <a:r>
-              <a:rPr lang="de-DE" dirty="0" smtClean="0"/>
-              <a:t>– Server/Client</a:t>
+              <a:t>Systemarchitektur – Server/Client</a:t>
             </a:r>
             <a:endParaRPr lang="de-DE" dirty="0"/>
           </a:p>
@@ -5498,12 +5945,13 @@
             </a:r>
             <a:r>
               <a:rPr lang="de-DE" sz="2400" dirty="0" err="1" smtClean="0"/>
-              <a:t>Specator</a:t>
+              <a:t>Spectator</a:t>
             </a:r>
             <a:r>
               <a:rPr lang="de-DE" sz="2400" dirty="0" smtClean="0"/>
               <a:t>-View</a:t>
             </a:r>
+            <a:endParaRPr lang="de-DE" sz="2400" dirty="0" smtClean="0"/>
           </a:p>
           <a:p>
             <a:pPr lvl="0"/>
@@ -5658,11 +6106,7 @@
             <a:pPr algn="ctr"/>
             <a:r>
               <a:rPr lang="de-DE" dirty="0" smtClean="0"/>
-              <a:t>Systemarchitektur </a:t>
-            </a:r>
-            <a:r>
-              <a:rPr lang="de-DE" dirty="0" smtClean="0"/>
-              <a:t>– ActionCam</a:t>
+              <a:t>Systemarchitektur – ActionCam</a:t>
             </a:r>
             <a:endParaRPr lang="de-DE" dirty="0"/>
           </a:p>
@@ -5852,11 +6296,7 @@
             <a:pPr algn="ctr"/>
             <a:r>
               <a:rPr lang="de-DE" dirty="0" smtClean="0"/>
-              <a:t>Systemarchitektur </a:t>
-            </a:r>
-            <a:r>
-              <a:rPr lang="de-DE" dirty="0" smtClean="0"/>
-              <a:t>– Flugphysik</a:t>
+              <a:t>Systemarchitektur – Flugphysik</a:t>
             </a:r>
             <a:endParaRPr lang="de-DE" dirty="0"/>
           </a:p>
@@ -11403,7 +11843,7 @@
           <p:nvPr>
             <p:extLst>
               <p:ext uri="{D42A27DB-BD31-4B8C-83A1-F6EECF244321}">
-                <p14:modId xmlns:p14="http://schemas.microsoft.com/office/powerpoint/2010/main" val="898857495"/>
+                <p14:modId xmlns="" xmlns:p14="http://schemas.microsoft.com/office/powerpoint/2010/main" val="898857495"/>
               </p:ext>
             </p:extLst>
           </p:nvPr>
@@ -12038,7 +12478,7 @@
           <p:nvPr>
             <p:extLst>
               <p:ext uri="{D42A27DB-BD31-4B8C-83A1-F6EECF244321}">
-                <p14:modId xmlns:p14="http://schemas.microsoft.com/office/powerpoint/2010/main" val="4014866363"/>
+                <p14:modId xmlns="" xmlns:p14="http://schemas.microsoft.com/office/powerpoint/2010/main" val="4014866363"/>
               </p:ext>
             </p:extLst>
           </p:nvPr>
@@ -12450,7 +12890,18 @@
                           <a:ea typeface="+mn-ea"/>
                           <a:cs typeface="+mn-cs"/>
                         </a:rPr>
-                        <a:t>, Investigation, Clean </a:t>
+                        <a:t>, Investigation, </a:t>
+                      </a:r>
+                      <a:r>
+                        <a:rPr kumimoji="0" lang="de-DE" kern="1200" dirty="0" smtClean="0">
+                          <a:solidFill>
+                            <a:schemeClr val="dk1"/>
+                          </a:solidFill>
+                          <a:latin typeface="+mj-lt"/>
+                          <a:ea typeface="+mn-ea"/>
+                          <a:cs typeface="+mn-cs"/>
+                        </a:rPr>
+                        <a:t>Clean-</a:t>
                       </a:r>
                       <a:r>
                         <a:rPr kumimoji="0" lang="de-DE" kern="1200" dirty="0" err="1" smtClean="0">
@@ -12461,7 +12912,7 @@
                           <a:ea typeface="+mn-ea"/>
                           <a:cs typeface="+mn-cs"/>
                         </a:rPr>
-                        <a:t>up</a:t>
+                        <a:t>Up</a:t>
                       </a:r>
                       <a:endParaRPr kumimoji="0" lang="de-DE" kern="1200" dirty="0">
                         <a:solidFill>
@@ -12647,6 +13098,34 @@
           </a:p>
         </p:txBody>
       </p:sp>
+      <p:pic>
+        <p:nvPicPr>
+          <p:cNvPr id="4" name="RiftWingsuit_Demo.mp4">
+            <a:hlinkClick r:id="" action="ppaction://media"/>
+          </p:cNvPr>
+          <p:cNvPicPr>
+            <a:picLocks noRot="1" noChangeAspect="1"/>
+          </p:cNvPicPr>
+          <p:nvPr>
+            <a:videoFile r:link="rId1"/>
+          </p:nvPr>
+        </p:nvPicPr>
+        <p:blipFill>
+          <a:blip r:embed="rId3" cstate="print"/>
+          <a:stretch>
+            <a:fillRect/>
+          </a:stretch>
+        </p:blipFill>
+        <p:spPr>
+          <a:xfrm>
+            <a:off x="1259632" y="1561356"/>
+            <a:ext cx="6768752" cy="3804968"/>
+          </a:xfrm>
+          <a:prstGeom prst="rect">
+            <a:avLst/>
+          </a:prstGeom>
+        </p:spPr>
+      </p:pic>
     </p:spTree>
   </p:cSld>
   <p:clrMapOvr>
@@ -12655,7 +13134,92 @@
   <p:timing>
     <p:tnLst>
       <p:par>
-        <p:cTn id="1" dur="indefinite" restart="never" nodeType="tmRoot"/>
+        <p:cTn id="1" dur="indefinite" restart="never" nodeType="tmRoot">
+          <p:childTnLst>
+            <p:seq concurrent="1" nextAc="seek">
+              <p:cTn id="2" restart="whenNotActive" fill="hold" evtFilter="cancelBubble" nodeType="interactiveSeq">
+                <p:stCondLst>
+                  <p:cond evt="onClick" delay="0">
+                    <p:tgtEl>
+                      <p:spTgt spid="4"/>
+                    </p:tgtEl>
+                  </p:cond>
+                </p:stCondLst>
+                <p:endSync evt="end" delay="0">
+                  <p:rtn val="all"/>
+                </p:endSync>
+                <p:childTnLst>
+                  <p:par>
+                    <p:cTn id="3" fill="hold">
+                      <p:stCondLst>
+                        <p:cond delay="0"/>
+                      </p:stCondLst>
+                      <p:childTnLst>
+                        <p:par>
+                          <p:cTn id="4" fill="hold">
+                            <p:stCondLst>
+                              <p:cond delay="0"/>
+                            </p:stCondLst>
+                            <p:childTnLst>
+                              <p:par>
+                                <p:cTn id="5" presetID="2" presetClass="mediacall" presetSubtype="0" fill="hold" nodeType="clickEffect">
+                                  <p:stCondLst>
+                                    <p:cond delay="0"/>
+                                  </p:stCondLst>
+                                  <p:childTnLst>
+                                    <p:cmd type="call" cmd="togglePause">
+                                      <p:cBhvr>
+                                        <p:cTn id="6" dur="1" fill="hold"/>
+                                        <p:tgtEl>
+                                          <p:spTgt spid="4"/>
+                                        </p:tgtEl>
+                                      </p:cBhvr>
+                                    </p:cmd>
+                                  </p:childTnLst>
+                                </p:cTn>
+                              </p:par>
+                            </p:childTnLst>
+                          </p:cTn>
+                        </p:par>
+                      </p:childTnLst>
+                    </p:cTn>
+                  </p:par>
+                </p:childTnLst>
+              </p:cTn>
+              <p:nextCondLst>
+                <p:cond evt="onClick" delay="0">
+                  <p:tgtEl>
+                    <p:spTgt spid="4"/>
+                  </p:tgtEl>
+                </p:cond>
+              </p:nextCondLst>
+            </p:seq>
+            <p:video>
+              <p:cMediaNode>
+                <p:cTn id="7" fill="hold" display="0">
+                  <p:stCondLst>
+                    <p:cond delay="indefinite"/>
+                  </p:stCondLst>
+                  <p:endCondLst>
+                    <p:cond evt="onNext" delay="0">
+                      <p:tgtEl>
+                        <p:sldTgt/>
+                      </p:tgtEl>
+                    </p:cond>
+                    <p:cond evt="onPrev" delay="0">
+                      <p:tgtEl>
+                        <p:sldTgt/>
+                      </p:tgtEl>
+                    </p:cond>
+                  </p:endCondLst>
+                </p:cTn>
+                <p:tgtEl>
+                  <p:spTgt spid="4"/>
+                </p:tgtEl>
+              </p:cMediaNode>
+            </p:video>
+          </p:childTnLst>
+        </p:cTn>
       </p:par>
     </p:tnLst>
   </p:timing>
@@ -13515,11 +14079,7 @@
             <a:pPr algn="ctr"/>
             <a:r>
               <a:rPr lang="de-DE" dirty="0" smtClean="0"/>
-              <a:t>Systemarchitektur </a:t>
-            </a:r>
-            <a:r>
-              <a:rPr lang="de-DE" dirty="0" smtClean="0"/>
-              <a:t>- Welt</a:t>
+              <a:t>Systemarchitektur - Welt</a:t>
             </a:r>
             <a:endParaRPr lang="de-DE" dirty="0"/>
           </a:p>
@@ -13603,8 +14163,9 @@
             <a:pPr lvl="1"/>
             <a:r>
               <a:rPr lang="de-DE" dirty="0" smtClean="0"/>
-              <a:t>….</a:t>
-            </a:r>
+              <a:t>Ambiente</a:t>
+            </a:r>
+            <a:endParaRPr lang="de-DE" dirty="0" smtClean="0"/>
           </a:p>
           <a:p>
             <a:pPr>
@@ -13650,7 +14211,7 @@
           <p:nvPr/>
         </p:nvPicPr>
         <p:blipFill>
-          <a:blip r:embed="rId2" cstate="print"/>
+          <a:blip r:embed="rId3" cstate="print"/>
           <a:srcRect/>
           <a:stretch>
             <a:fillRect/>
@@ -13724,11 +14285,7 @@
             <a:pPr algn="ctr"/>
             <a:r>
               <a:rPr lang="de-DE" dirty="0" smtClean="0"/>
-              <a:t>Systemarchitektur </a:t>
-            </a:r>
-            <a:r>
-              <a:rPr lang="de-DE" dirty="0" smtClean="0"/>
-              <a:t>- Welt</a:t>
+              <a:t>Systemarchitektur - Welt</a:t>
             </a:r>
             <a:endParaRPr lang="de-DE" dirty="0"/>
           </a:p>
@@ -13877,7 +14434,7 @@
     </p:spTree>
     <p:extLst>
       <p:ext uri="{BB962C8B-B14F-4D97-AF65-F5344CB8AC3E}">
-        <p14:creationId xmlns:p14="http://schemas.microsoft.com/office/powerpoint/2010/main" val="3486165658"/>
+        <p14:creationId xmlns="" xmlns:p14="http://schemas.microsoft.com/office/powerpoint/2010/main" val="3486165658"/>
       </p:ext>
     </p:extLst>
   </p:cSld>
@@ -13936,11 +14493,7 @@
             <a:pPr algn="ctr"/>
             <a:r>
               <a:rPr lang="de-DE" dirty="0" smtClean="0"/>
-              <a:t>Systemarchitektur </a:t>
-            </a:r>
-            <a:r>
-              <a:rPr lang="de-DE" dirty="0" smtClean="0"/>
-              <a:t>- Welt</a:t>
+              <a:t>Systemarchitektur - Welt</a:t>
             </a:r>
             <a:endParaRPr lang="de-DE" dirty="0"/>
           </a:p>
@@ -14040,7 +14593,7 @@
           <a:blip r:embed="rId2" cstate="print">
             <a:extLst>
               <a:ext uri="{28A0092B-C50C-407E-A947-70E740481C1C}">
-                <a14:useLocalDpi xmlns:a14="http://schemas.microsoft.com/office/drawing/2010/main" val="0"/>
+                <a14:useLocalDpi xmlns="" xmlns:a14="http://schemas.microsoft.com/office/drawing/2010/main" val="0"/>
               </a:ext>
             </a:extLst>
           </a:blip>
@@ -14058,7 +14611,7 @@
     </p:spTree>
     <p:extLst>
       <p:ext uri="{BB962C8B-B14F-4D97-AF65-F5344CB8AC3E}">
-        <p14:creationId xmlns:p14="http://schemas.microsoft.com/office/powerpoint/2010/main" val="384760063"/>
+        <p14:creationId xmlns="" xmlns:p14="http://schemas.microsoft.com/office/powerpoint/2010/main" val="384760063"/>
       </p:ext>
     </p:extLst>
   </p:cSld>
@@ -14117,11 +14670,7 @@
             <a:pPr algn="ctr"/>
             <a:r>
               <a:rPr lang="de-DE" dirty="0" smtClean="0"/>
-              <a:t>Systemarchitektur </a:t>
-            </a:r>
-            <a:r>
-              <a:rPr lang="de-DE" dirty="0" smtClean="0"/>
-              <a:t>- Spieler</a:t>
+              <a:t>Systemarchitektur - Spieler</a:t>
             </a:r>
             <a:endParaRPr lang="de-DE" dirty="0"/>
           </a:p>
@@ -14253,7 +14802,7 @@
           <p:nvPr/>
         </p:nvPicPr>
         <p:blipFill>
-          <a:blip r:embed="rId2" cstate="print"/>
+          <a:blip r:embed="rId3" cstate="print"/>
           <a:srcRect/>
           <a:stretch>
             <a:fillRect/>
@@ -14327,11 +14876,7 @@
             <a:pPr algn="ctr"/>
             <a:r>
               <a:rPr lang="de-DE" dirty="0" smtClean="0"/>
-              <a:t>Systemarchitektur </a:t>
-            </a:r>
-            <a:r>
-              <a:rPr lang="de-DE" dirty="0" smtClean="0"/>
-              <a:t>- Spieler</a:t>
+              <a:t>Systemarchitektur - Spieler</a:t>
             </a:r>
             <a:endParaRPr lang="de-DE" dirty="0"/>
           </a:p>
@@ -14401,12 +14946,12 @@
               <a:t>Wird automatisch </a:t>
             </a:r>
             <a:r>
-              <a:rPr lang="de-DE" dirty="0" err="1" smtClean="0"/>
-              <a:t>instanziert</a:t>
-            </a:r>
-            <a:r>
               <a:rPr lang="de-DE" dirty="0" smtClean="0"/>
-              <a:t> sobald Server erstellt wurde</a:t>
+              <a:t>instanziiert </a:t>
+            </a:r>
+            <a:r>
+              <a:rPr lang="de-DE" dirty="0" smtClean="0"/>
+              <a:t>sobald Server erstellt wurde</a:t>
             </a:r>
           </a:p>
           <a:p>
@@ -14459,7 +15004,7 @@
           <p:nvPr/>
         </p:nvPicPr>
         <p:blipFill>
-          <a:blip r:embed="rId2" cstate="print"/>
+          <a:blip r:embed="rId3" cstate="print"/>
           <a:srcRect/>
           <a:stretch>
             <a:fillRect/>
@@ -14533,11 +15078,7 @@
             <a:pPr algn="ctr"/>
             <a:r>
               <a:rPr lang="de-DE" dirty="0" smtClean="0"/>
-              <a:t>Systemarchitektur </a:t>
-            </a:r>
-            <a:r>
-              <a:rPr lang="de-DE" dirty="0" smtClean="0"/>
-              <a:t>- </a:t>
+              <a:t>Systemarchitektur - </a:t>
             </a:r>
             <a:r>
               <a:rPr lang="de-DE" dirty="0" err="1" smtClean="0"/>

</xml_diff>